<commit_message>
update apresentação do treinamento.
</commit_message>
<xml_diff>
--- a/docs/presentation/treimamento.pptx
+++ b/docs/presentation/treimamento.pptx
@@ -3267,7 +3267,7 @@
           <a:solidFill>
             <a:schemeClr val="tx1"/>
           </a:solidFill>
-          <a:latin typeface="Arial" panose="020B0604020202020204" pitchFamily="34" charset="0"/>
+          <a:latin typeface="Arial" panose="02080604020202020204" pitchFamily="34" charset="0"/>
           <a:ea typeface="SimSun" pitchFamily="2" charset="-122"/>
         </a:defRPr>
       </a:lvl2pPr>
@@ -3282,7 +3282,7 @@
           <a:solidFill>
             <a:schemeClr val="tx1"/>
           </a:solidFill>
-          <a:latin typeface="Arial" panose="020B0604020202020204" pitchFamily="34" charset="0"/>
+          <a:latin typeface="Arial" panose="02080604020202020204" pitchFamily="34" charset="0"/>
           <a:ea typeface="SimSun" pitchFamily="2" charset="-122"/>
         </a:defRPr>
       </a:lvl3pPr>
@@ -3297,7 +3297,7 @@
           <a:solidFill>
             <a:schemeClr val="tx1"/>
           </a:solidFill>
-          <a:latin typeface="Arial" panose="020B0604020202020204" pitchFamily="34" charset="0"/>
+          <a:latin typeface="Arial" panose="02080604020202020204" pitchFamily="34" charset="0"/>
           <a:ea typeface="SimSun" pitchFamily="2" charset="-122"/>
         </a:defRPr>
       </a:lvl4pPr>
@@ -3312,7 +3312,7 @@
           <a:solidFill>
             <a:schemeClr val="tx1"/>
           </a:solidFill>
-          <a:latin typeface="Arial" panose="020B0604020202020204" pitchFamily="34" charset="0"/>
+          <a:latin typeface="Arial" panose="02080604020202020204" pitchFamily="34" charset="0"/>
           <a:ea typeface="SimSun" pitchFamily="2" charset="-122"/>
         </a:defRPr>
       </a:lvl5pPr>
@@ -3327,7 +3327,7 @@
           <a:solidFill>
             <a:schemeClr val="tx1"/>
           </a:solidFill>
-          <a:latin typeface="Arial" panose="020B0604020202020204" pitchFamily="34" charset="0"/>
+          <a:latin typeface="Arial" panose="02080604020202020204" pitchFamily="34" charset="0"/>
           <a:ea typeface="SimSun" pitchFamily="2" charset="-122"/>
         </a:defRPr>
       </a:lvl6pPr>
@@ -3342,7 +3342,7 @@
           <a:solidFill>
             <a:schemeClr val="tx1"/>
           </a:solidFill>
-          <a:latin typeface="Arial" panose="020B0604020202020204" pitchFamily="34" charset="0"/>
+          <a:latin typeface="Arial" panose="02080604020202020204" pitchFamily="34" charset="0"/>
           <a:ea typeface="SimSun" pitchFamily="2" charset="-122"/>
         </a:defRPr>
       </a:lvl7pPr>
@@ -3357,7 +3357,7 @@
           <a:solidFill>
             <a:schemeClr val="tx1"/>
           </a:solidFill>
-          <a:latin typeface="Arial" panose="020B0604020202020204" pitchFamily="34" charset="0"/>
+          <a:latin typeface="Arial" panose="02080604020202020204" pitchFamily="34" charset="0"/>
           <a:ea typeface="SimSun" pitchFamily="2" charset="-122"/>
         </a:defRPr>
       </a:lvl8pPr>
@@ -3372,7 +3372,7 @@
           <a:solidFill>
             <a:schemeClr val="tx1"/>
           </a:solidFill>
-          <a:latin typeface="Arial" panose="020B0604020202020204" pitchFamily="34" charset="0"/>
+          <a:latin typeface="Arial" panose="02080604020202020204" pitchFamily="34" charset="0"/>
           <a:ea typeface="SimSun" pitchFamily="2" charset="-122"/>
         </a:defRPr>
       </a:lvl9pPr>
@@ -3470,7 +3470,7 @@
         <a:spcBef>
           <a:spcPts val="500"/>
         </a:spcBef>
-        <a:buFont typeface="Arial" panose="020B0604020202020204" pitchFamily="34" charset="0"/>
+        <a:buFont typeface="Arial" panose="02080604020202020204" pitchFamily="34" charset="0"/>
         <a:buChar char="•"/>
         <a:defRPr sz="1800" kern="1200">
           <a:solidFill>
@@ -3488,7 +3488,7 @@
         <a:spcBef>
           <a:spcPts val="500"/>
         </a:spcBef>
-        <a:buFont typeface="Arial" panose="020B0604020202020204" pitchFamily="34" charset="0"/>
+        <a:buFont typeface="Arial" panose="02080604020202020204" pitchFamily="34" charset="0"/>
         <a:buChar char="•"/>
         <a:defRPr sz="1800" kern="1200">
           <a:solidFill>
@@ -3506,7 +3506,7 @@
         <a:spcBef>
           <a:spcPts val="500"/>
         </a:spcBef>
-        <a:buFont typeface="Arial" panose="020B0604020202020204" pitchFamily="34" charset="0"/>
+        <a:buFont typeface="Arial" panose="02080604020202020204" pitchFamily="34" charset="0"/>
         <a:buChar char="•"/>
         <a:defRPr sz="1800" kern="1200">
           <a:solidFill>
@@ -3524,7 +3524,7 @@
         <a:spcBef>
           <a:spcPts val="500"/>
         </a:spcBef>
-        <a:buFont typeface="Arial" panose="020B0604020202020204" pitchFamily="34" charset="0"/>
+        <a:buFont typeface="Arial" panose="02080604020202020204" pitchFamily="34" charset="0"/>
         <a:buChar char="•"/>
         <a:defRPr sz="1800" kern="1200">
           <a:solidFill>
@@ -3661,7 +3661,15 @@
           <a:p>
             <a:r>
               <a:rPr lang="en-US" altLang="en-US"/>
-              <a:t>Treimamento</a:t>
+              <a:t>Trei</a:t>
+            </a:r>
+            <a:r>
+              <a:rPr lang="" altLang="en-US"/>
+              <a:t>n</a:t>
+            </a:r>
+            <a:r>
+              <a:rPr lang="en-US" altLang="en-US"/>
+              <a:t>amento</a:t>
             </a:r>
             <a:endParaRPr lang="en-US" altLang="en-US"/>
           </a:p>
@@ -3697,8 +3705,8 @@
         </p:nvSpPr>
         <p:spPr>
           <a:xfrm>
-            <a:off x="8794750" y="5796280"/>
-            <a:ext cx="3312795" cy="645160"/>
+            <a:off x="8547100" y="5796280"/>
+            <a:ext cx="3560445" cy="645160"/>
           </a:xfrm>
           <a:prstGeom prst="rect">
             <a:avLst/>
@@ -3733,8 +3741,8 @@
         </p:nvSpPr>
         <p:spPr>
           <a:xfrm>
-            <a:off x="8691245" y="6441440"/>
-            <a:ext cx="3824605" cy="245110"/>
+            <a:off x="8265795" y="6441440"/>
+            <a:ext cx="4385310" cy="245110"/>
           </a:xfrm>
           <a:prstGeom prst="rect">
             <a:avLst/>
@@ -4736,15 +4744,7 @@
             <a:pPr lvl="0"/>
             <a:r>
               <a:rPr lang="en-US" altLang="en-US"/>
-              <a:t>Vamos para o ex</a:t>
-            </a:r>
-            <a:r>
-              <a:rPr lang="" altLang="en-US"/>
-              <a:t>e</a:t>
-            </a:r>
-            <a:r>
-              <a:rPr lang="en-US" altLang="en-US"/>
-              <a:t>mplo.</a:t>
+              <a:t>Vamos para o exemplo.</a:t>
             </a:r>
             <a:endParaRPr lang="en-US" altLang="en-US"/>
           </a:p>
@@ -5264,12 +5264,6 @@
           <a:bodyPr/>
           <a:p>
             <a:pPr lvl="0"/>
-            <a:r>
-              <a:rPr lang="en-US" altLang="en-US">
-                <a:sym typeface="+mn-ea"/>
-              </a:rPr>
-              <a:t>Vamos para o examplo.</a:t>
-            </a:r>
             <a:endParaRPr lang="en-US" altLang="en-US"/>
           </a:p>
         </p:txBody>
@@ -5343,7 +5337,7 @@
               <a:spcBef>
                 <a:spcPts val="1000"/>
               </a:spcBef>
-              <a:buFont typeface="Arial" panose="020B0604020202020204" pitchFamily="34" charset="0"/>
+              <a:buFont typeface="Arial" panose="02080604020202020204" pitchFamily="34" charset="0"/>
               <a:buChar char="•"/>
               <a:defRPr sz="2800" kern="1200">
                 <a:solidFill>
@@ -5361,7 +5355,7 @@
               <a:spcBef>
                 <a:spcPts val="500"/>
               </a:spcBef>
-              <a:buFont typeface="Arial" panose="020B0604020202020204" pitchFamily="34" charset="0"/>
+              <a:buFont typeface="Arial" panose="02080604020202020204" pitchFamily="34" charset="0"/>
               <a:buChar char="•"/>
               <a:defRPr sz="2400" kern="1200">
                 <a:solidFill>
@@ -5379,7 +5373,7 @@
               <a:spcBef>
                 <a:spcPts val="500"/>
               </a:spcBef>
-              <a:buFont typeface="Arial" panose="020B0604020202020204" pitchFamily="34" charset="0"/>
+              <a:buFont typeface="Arial" panose="02080604020202020204" pitchFamily="34" charset="0"/>
               <a:buChar char="•"/>
               <a:defRPr sz="2000" kern="1200">
                 <a:solidFill>
@@ -5397,7 +5391,7 @@
               <a:spcBef>
                 <a:spcPts val="500"/>
               </a:spcBef>
-              <a:buFont typeface="Arial" panose="020B0604020202020204" pitchFamily="34" charset="0"/>
+              <a:buFont typeface="Arial" panose="02080604020202020204" pitchFamily="34" charset="0"/>
               <a:buChar char="•"/>
               <a:defRPr sz="1800" kern="1200">
                 <a:solidFill>
@@ -5415,7 +5409,7 @@
               <a:spcBef>
                 <a:spcPts val="500"/>
               </a:spcBef>
-              <a:buFont typeface="Arial" panose="020B0604020202020204" pitchFamily="34" charset="0"/>
+              <a:buFont typeface="Arial" panose="02080604020202020204" pitchFamily="34" charset="0"/>
               <a:buChar char="•"/>
               <a:defRPr sz="1800" kern="1200">
                 <a:solidFill>
@@ -5433,7 +5427,7 @@
               <a:spcBef>
                 <a:spcPts val="500"/>
               </a:spcBef>
-              <a:buFont typeface="Arial" panose="020B0604020202020204" pitchFamily="34" charset="0"/>
+              <a:buFont typeface="Arial" panose="02080604020202020204" pitchFamily="34" charset="0"/>
               <a:buChar char="•"/>
               <a:defRPr sz="1800" kern="1200">
                 <a:solidFill>
@@ -5451,7 +5445,7 @@
               <a:spcBef>
                 <a:spcPts val="500"/>
               </a:spcBef>
-              <a:buFont typeface="Arial" panose="020B0604020202020204" pitchFamily="34" charset="0"/>
+              <a:buFont typeface="Arial" panose="02080604020202020204" pitchFamily="34" charset="0"/>
               <a:buChar char="•"/>
               <a:defRPr sz="1800" kern="1200">
                 <a:solidFill>
@@ -5469,7 +5463,7 @@
               <a:spcBef>
                 <a:spcPts val="500"/>
               </a:spcBef>
-              <a:buFont typeface="Arial" panose="020B0604020202020204" pitchFamily="34" charset="0"/>
+              <a:buFont typeface="Arial" panose="02080604020202020204" pitchFamily="34" charset="0"/>
               <a:buChar char="•"/>
               <a:defRPr sz="1800" kern="1200">
                 <a:solidFill>
@@ -5487,7 +5481,7 @@
               <a:spcBef>
                 <a:spcPts val="500"/>
               </a:spcBef>
-              <a:buFont typeface="Arial" panose="020B0604020202020204" pitchFamily="34" charset="0"/>
+              <a:buFont typeface="Arial" panose="02080604020202020204" pitchFamily="34" charset="0"/>
               <a:buChar char="•"/>
               <a:defRPr sz="1800" kern="1200">
                 <a:solidFill>
@@ -6980,7 +6974,7 @@
               <a:schemeClr val="tx1"/>
             </a:solidFill>
             <a:effectLst/>
-            <a:latin typeface="Arial" panose="020B0604020202020204" pitchFamily="34" charset="0"/>
+            <a:latin typeface="Arial" panose="02080604020202020204" pitchFamily="34" charset="0"/>
             <a:ea typeface="SimSun" pitchFamily="2" charset="-122"/>
           </a:defRPr>
         </a:defPPr>
@@ -7045,7 +7039,7 @@
               <a:schemeClr val="tx1"/>
             </a:solidFill>
             <a:effectLst/>
-            <a:latin typeface="Arial" panose="020B0604020202020204" pitchFamily="34" charset="0"/>
+            <a:latin typeface="Arial" panose="02080604020202020204" pitchFamily="34" charset="0"/>
             <a:ea typeface="SimSun" pitchFamily="2" charset="-122"/>
           </a:defRPr>
         </a:defPPr>

</xml_diff>